<commit_message>
changementd doc ananlyse 3 + flocation et fproduct
</commit_message>
<xml_diff>
--- a/Remise3/DocAnalyseSprint3.pptx
+++ b/Remise3/DocAnalyseSprint3.pptx
@@ -5,7 +5,9 @@
     <p:sldMasterId id="2147483648" r:id="rId1"/>
   </p:sldMasterIdLst>
   <p:sldIdLst>
-    <p:sldId id="256" r:id="rId2"/>
+    <p:sldId id="258" r:id="rId2"/>
+    <p:sldId id="256" r:id="rId3"/>
+    <p:sldId id="257" r:id="rId4"/>
   </p:sldIdLst>
   <p:sldSz cx="12192000" cy="6858000"/>
   <p:notesSz cx="6858000" cy="9144000"/>
@@ -104,6 +106,11 @@
       </a:defRPr>
     </a:lvl9pPr>
   </p:defaultTextStyle>
+  <p:extLst>
+    <p:ext uri="{EFAFB233-063F-42B5-8137-9DF3F51BA10A}">
+      <p15:sldGuideLst xmlns:p15="http://schemas.microsoft.com/office/powerpoint/2012/main"/>
+    </p:ext>
+  </p:extLst>
 </p:presentation>
 </file>
 
@@ -256,7 +263,7 @@
           <a:p>
             <a:fld id="{581539BC-1286-4B45-B3C8-4782118E5982}" type="datetimeFigureOut">
               <a:rPr lang="fr-CA" smtClean="0"/>
-              <a:t>2020-05-05</a:t>
+              <a:t>2020-05-07</a:t>
             </a:fld>
             <a:endParaRPr lang="fr-CA"/>
           </a:p>
@@ -456,7 +463,7 @@
           <a:p>
             <a:fld id="{581539BC-1286-4B45-B3C8-4782118E5982}" type="datetimeFigureOut">
               <a:rPr lang="fr-CA" smtClean="0"/>
-              <a:t>2020-05-05</a:t>
+              <a:t>2020-05-07</a:t>
             </a:fld>
             <a:endParaRPr lang="fr-CA"/>
           </a:p>
@@ -666,7 +673,7 @@
           <a:p>
             <a:fld id="{581539BC-1286-4B45-B3C8-4782118E5982}" type="datetimeFigureOut">
               <a:rPr lang="fr-CA" smtClean="0"/>
-              <a:t>2020-05-05</a:t>
+              <a:t>2020-05-07</a:t>
             </a:fld>
             <a:endParaRPr lang="fr-CA"/>
           </a:p>
@@ -866,7 +873,7 @@
           <a:p>
             <a:fld id="{581539BC-1286-4B45-B3C8-4782118E5982}" type="datetimeFigureOut">
               <a:rPr lang="fr-CA" smtClean="0"/>
-              <a:t>2020-05-05</a:t>
+              <a:t>2020-05-07</a:t>
             </a:fld>
             <a:endParaRPr lang="fr-CA"/>
           </a:p>
@@ -1142,7 +1149,7 @@
           <a:p>
             <a:fld id="{581539BC-1286-4B45-B3C8-4782118E5982}" type="datetimeFigureOut">
               <a:rPr lang="fr-CA" smtClean="0"/>
-              <a:t>2020-05-05</a:t>
+              <a:t>2020-05-07</a:t>
             </a:fld>
             <a:endParaRPr lang="fr-CA"/>
           </a:p>
@@ -1410,7 +1417,7 @@
           <a:p>
             <a:fld id="{581539BC-1286-4B45-B3C8-4782118E5982}" type="datetimeFigureOut">
               <a:rPr lang="fr-CA" smtClean="0"/>
-              <a:t>2020-05-05</a:t>
+              <a:t>2020-05-07</a:t>
             </a:fld>
             <a:endParaRPr lang="fr-CA"/>
           </a:p>
@@ -1825,7 +1832,7 @@
           <a:p>
             <a:fld id="{581539BC-1286-4B45-B3C8-4782118E5982}" type="datetimeFigureOut">
               <a:rPr lang="fr-CA" smtClean="0"/>
-              <a:t>2020-05-05</a:t>
+              <a:t>2020-05-07</a:t>
             </a:fld>
             <a:endParaRPr lang="fr-CA"/>
           </a:p>
@@ -1967,7 +1974,7 @@
           <a:p>
             <a:fld id="{581539BC-1286-4B45-B3C8-4782118E5982}" type="datetimeFigureOut">
               <a:rPr lang="fr-CA" smtClean="0"/>
-              <a:t>2020-05-05</a:t>
+              <a:t>2020-05-07</a:t>
             </a:fld>
             <a:endParaRPr lang="fr-CA"/>
           </a:p>
@@ -2080,7 +2087,7 @@
           <a:p>
             <a:fld id="{581539BC-1286-4B45-B3C8-4782118E5982}" type="datetimeFigureOut">
               <a:rPr lang="fr-CA" smtClean="0"/>
-              <a:t>2020-05-05</a:t>
+              <a:t>2020-05-07</a:t>
             </a:fld>
             <a:endParaRPr lang="fr-CA"/>
           </a:p>
@@ -2393,7 +2400,7 @@
           <a:p>
             <a:fld id="{581539BC-1286-4B45-B3C8-4782118E5982}" type="datetimeFigureOut">
               <a:rPr lang="fr-CA" smtClean="0"/>
-              <a:t>2020-05-05</a:t>
+              <a:t>2020-05-07</a:t>
             </a:fld>
             <a:endParaRPr lang="fr-CA"/>
           </a:p>
@@ -2682,7 +2689,7 @@
           <a:p>
             <a:fld id="{581539BC-1286-4B45-B3C8-4782118E5982}" type="datetimeFigureOut">
               <a:rPr lang="fr-CA" smtClean="0"/>
-              <a:t>2020-05-05</a:t>
+              <a:t>2020-05-07</a:t>
             </a:fld>
             <a:endParaRPr lang="fr-CA"/>
           </a:p>
@@ -2925,7 +2932,7 @@
           <a:p>
             <a:fld id="{581539BC-1286-4B45-B3C8-4782118E5982}" type="datetimeFigureOut">
               <a:rPr lang="fr-CA" smtClean="0"/>
-              <a:t>2020-05-05</a:t>
+              <a:t>2020-05-07</a:t>
             </a:fld>
             <a:endParaRPr lang="fr-CA"/>
           </a:p>
@@ -3344,6 +3351,98 @@
       </p:grpSpPr>
       <p:sp>
         <p:nvSpPr>
+          <p:cNvPr id="2" name="Titre 1">
+            <a:extLst>
+              <a:ext uri="{FF2B5EF4-FFF2-40B4-BE49-F238E27FC236}">
+                <a16:creationId xmlns:a16="http://schemas.microsoft.com/office/drawing/2014/main" id="{8D7DE038-0709-4AC7-8505-490781010A1D}"/>
+              </a:ext>
+            </a:extLst>
+          </p:cNvPr>
+          <p:cNvSpPr>
+            <a:spLocks noGrp="1"/>
+          </p:cNvSpPr>
+          <p:nvPr>
+            <p:ph type="title"/>
+          </p:nvPr>
+        </p:nvSpPr>
+        <p:spPr/>
+        <p:txBody>
+          <a:bodyPr/>
+          <a:lstStyle/>
+          <a:p>
+            <a:r>
+              <a:rPr lang="fr-CA" dirty="0"/>
+              <a:t>Couleurs</a:t>
+            </a:r>
+          </a:p>
+        </p:txBody>
+      </p:sp>
+      <p:sp>
+        <p:nvSpPr>
+          <p:cNvPr id="3" name="Espace réservé du contenu 2">
+            <a:extLst>
+              <a:ext uri="{FF2B5EF4-FFF2-40B4-BE49-F238E27FC236}">
+                <a16:creationId xmlns:a16="http://schemas.microsoft.com/office/drawing/2014/main" id="{A9DF4CC3-3ACA-4A15-B2FD-B5A34D29A733}"/>
+              </a:ext>
+            </a:extLst>
+          </p:cNvPr>
+          <p:cNvSpPr>
+            <a:spLocks noGrp="1"/>
+          </p:cNvSpPr>
+          <p:nvPr>
+            <p:ph idx="1"/>
+          </p:nvPr>
+        </p:nvSpPr>
+        <p:spPr/>
+        <p:txBody>
+          <a:bodyPr/>
+          <a:lstStyle/>
+          <a:p>
+            <a:r>
+              <a:rPr lang="fr-CA" dirty="0"/>
+              <a:t>Les couleurs dans l’ébauche d’interface ne sont que pour séparer les sections, elles ne seront pas les couleurs finales de l’interface…</a:t>
+            </a:r>
+          </a:p>
+          <a:p>
+            <a:r>
+              <a:rPr lang="fr-CA" dirty="0"/>
+              <a:t>Pour ce qui est des vraies couleurs, elles ne sont pas encore choisies et ne sont pas très importantes, le client nous a spécifié que le design était la dernière chose sur laquelle travailler, qu’il voulait une interface simple et qui marche bien ,pas quelque chose de beau qui manque de fonctionnalités. </a:t>
+            </a:r>
+          </a:p>
+        </p:txBody>
+      </p:sp>
+    </p:spTree>
+    <p:extLst>
+      <p:ext uri="{BB962C8B-B14F-4D97-AF65-F5344CB8AC3E}">
+        <p14:creationId xmlns:p14="http://schemas.microsoft.com/office/powerpoint/2010/main" val="474827098"/>
+      </p:ext>
+    </p:extLst>
+  </p:cSld>
+  <p:clrMapOvr>
+    <a:masterClrMapping/>
+  </p:clrMapOvr>
+</p:sld>
+</file>
+
+<file path=ppt/slides/slide2.xml><?xml version="1.0" encoding="utf-8"?>
+<p:sld xmlns:a="http://schemas.openxmlformats.org/drawingml/2006/main" xmlns:r="http://schemas.openxmlformats.org/officeDocument/2006/relationships" xmlns:p="http://schemas.openxmlformats.org/presentationml/2006/main">
+  <p:cSld>
+    <p:spTree>
+      <p:nvGrpSpPr>
+        <p:cNvPr id="1" name=""/>
+        <p:cNvGrpSpPr/>
+        <p:nvPr/>
+      </p:nvGrpSpPr>
+      <p:grpSpPr>
+        <a:xfrm>
+          <a:off x="0" y="0"/>
+          <a:ext cx="0" cy="0"/>
+          <a:chOff x="0" y="0"/>
+          <a:chExt cx="0" cy="0"/>
+        </a:xfrm>
+      </p:grpSpPr>
+      <p:sp>
+        <p:nvSpPr>
           <p:cNvPr id="4" name="Rectangle 3">
             <a:extLst>
               <a:ext uri="{FF2B5EF4-FFF2-40B4-BE49-F238E27FC236}">
@@ -3558,26 +3657,30 @@
             <a:pPr algn="ctr"/>
             <a:r>
               <a:rPr lang="en-US" dirty="0"/>
-              <a:t>Stock par localization(les couleurs </a:t>
-            </a:r>
-            <a:r>
-              <a:rPr lang="en-US" dirty="0" err="1"/>
+              <a:t>Stock par localization(</a:t>
+            </a:r>
+            <a:r>
+              <a:rPr lang="en-US" b="1" dirty="0"/>
+              <a:t>les couleurs </a:t>
+            </a:r>
+            <a:r>
+              <a:rPr lang="en-US" b="1" dirty="0" err="1"/>
               <a:t>sont</a:t>
             </a:r>
             <a:r>
-              <a:rPr lang="en-US" dirty="0"/>
+              <a:rPr lang="en-US" b="1" dirty="0"/>
               <a:t> a </a:t>
             </a:r>
             <a:r>
-              <a:rPr lang="en-US" dirty="0" err="1"/>
+              <a:rPr lang="en-US" b="1" dirty="0" err="1"/>
               <a:t>titre</a:t>
             </a:r>
             <a:r>
-              <a:rPr lang="en-US" dirty="0"/>
+              <a:rPr lang="en-US" b="1" dirty="0"/>
               <a:t> indicative </a:t>
             </a:r>
             <a:r>
-              <a:rPr lang="en-US" dirty="0" err="1"/>
+              <a:rPr lang="en-US" b="1" dirty="0" err="1"/>
               <a:t>seulement</a:t>
             </a:r>
             <a:r>
@@ -3850,7 +3953,7 @@
           <p:nvPr>
             <p:extLst>
               <p:ext uri="{D42A27DB-BD31-4B8C-83A1-F6EECF244321}">
-                <p14:modId xmlns:p14="http://schemas.microsoft.com/office/powerpoint/2010/main" val="3936442127"/>
+                <p14:modId xmlns:p14="http://schemas.microsoft.com/office/powerpoint/2010/main" val="1827746578"/>
               </p:ext>
             </p:extLst>
           </p:nvPr>
@@ -4802,6 +4905,129 @@
     <p:extLst>
       <p:ext uri="{BB962C8B-B14F-4D97-AF65-F5344CB8AC3E}">
         <p14:creationId xmlns:p14="http://schemas.microsoft.com/office/powerpoint/2010/main" val="108829074"/>
+      </p:ext>
+    </p:extLst>
+  </p:cSld>
+  <p:clrMapOvr>
+    <a:masterClrMapping/>
+  </p:clrMapOvr>
+</p:sld>
+</file>
+
+<file path=ppt/slides/slide3.xml><?xml version="1.0" encoding="utf-8"?>
+<p:sld xmlns:a="http://schemas.openxmlformats.org/drawingml/2006/main" xmlns:r="http://schemas.openxmlformats.org/officeDocument/2006/relationships" xmlns:p="http://schemas.openxmlformats.org/presentationml/2006/main">
+  <p:cSld>
+    <p:spTree>
+      <p:nvGrpSpPr>
+        <p:cNvPr id="1" name=""/>
+        <p:cNvGrpSpPr/>
+        <p:nvPr/>
+      </p:nvGrpSpPr>
+      <p:grpSpPr>
+        <a:xfrm>
+          <a:off x="0" y="0"/>
+          <a:ext cx="0" cy="0"/>
+          <a:chOff x="0" y="0"/>
+          <a:chExt cx="0" cy="0"/>
+        </a:xfrm>
+      </p:grpSpPr>
+      <p:sp>
+        <p:nvSpPr>
+          <p:cNvPr id="2" name="Titre 1">
+            <a:extLst>
+              <a:ext uri="{FF2B5EF4-FFF2-40B4-BE49-F238E27FC236}">
+                <a16:creationId xmlns:a16="http://schemas.microsoft.com/office/drawing/2014/main" id="{E53203D2-39D5-42AF-81BF-C884D9C83700}"/>
+              </a:ext>
+            </a:extLst>
+          </p:cNvPr>
+          <p:cNvSpPr>
+            <a:spLocks noGrp="1"/>
+          </p:cNvSpPr>
+          <p:nvPr>
+            <p:ph type="title"/>
+          </p:nvPr>
+        </p:nvSpPr>
+        <p:spPr/>
+        <p:txBody>
+          <a:bodyPr/>
+          <a:lstStyle/>
+          <a:p>
+            <a:r>
+              <a:rPr lang="en-US" dirty="0"/>
+              <a:t>Actions</a:t>
+            </a:r>
+            <a:endParaRPr lang="fr-CA" dirty="0"/>
+          </a:p>
+        </p:txBody>
+      </p:sp>
+      <p:sp>
+        <p:nvSpPr>
+          <p:cNvPr id="3" name="Espace réservé du contenu 2">
+            <a:extLst>
+              <a:ext uri="{FF2B5EF4-FFF2-40B4-BE49-F238E27FC236}">
+                <a16:creationId xmlns:a16="http://schemas.microsoft.com/office/drawing/2014/main" id="{F478394E-AB1C-4DF9-A603-107D80BA0421}"/>
+              </a:ext>
+            </a:extLst>
+          </p:cNvPr>
+          <p:cNvSpPr>
+            <a:spLocks noGrp="1"/>
+          </p:cNvSpPr>
+          <p:nvPr>
+            <p:ph idx="1"/>
+          </p:nvPr>
+        </p:nvSpPr>
+        <p:spPr/>
+        <p:txBody>
+          <a:bodyPr/>
+          <a:lstStyle/>
+          <a:p>
+            <a:r>
+              <a:rPr lang="en-US" dirty="0"/>
+              <a:t>La </a:t>
+            </a:r>
+            <a:r>
+              <a:rPr lang="en-US" dirty="0" err="1"/>
+              <a:t>liste</a:t>
+            </a:r>
+            <a:r>
+              <a:rPr lang="en-US" dirty="0"/>
+              <a:t> a gauche </a:t>
+            </a:r>
+            <a:r>
+              <a:rPr lang="en-US" dirty="0" err="1"/>
+              <a:t>permet</a:t>
+            </a:r>
+            <a:r>
+              <a:rPr lang="en-US" dirty="0"/>
+              <a:t> de changer de localization</a:t>
+            </a:r>
+          </a:p>
+          <a:p>
+            <a:r>
+              <a:rPr lang="fr-CA" dirty="0"/>
+              <a:t>Au changement dans cette liste, on rafraîchit la grille avec les données de la nouvelle localisation</a:t>
+            </a:r>
+          </a:p>
+          <a:p>
+            <a:r>
+              <a:rPr lang="fr-CA" dirty="0"/>
+              <a:t>On inscrit en bas a droite la valeur totale de l’</a:t>
+            </a:r>
+            <a:r>
+              <a:rPr lang="fr-CA" dirty="0" err="1"/>
+              <a:t>inventaite</a:t>
+            </a:r>
+            <a:r>
+              <a:rPr lang="fr-CA" dirty="0"/>
+              <a:t> pour cette localisation.</a:t>
+            </a:r>
+          </a:p>
+        </p:txBody>
+      </p:sp>
+    </p:spTree>
+    <p:extLst>
+      <p:ext uri="{BB962C8B-B14F-4D97-AF65-F5344CB8AC3E}">
+        <p14:creationId xmlns:p14="http://schemas.microsoft.com/office/powerpoint/2010/main" val="746431751"/>
       </p:ext>
     </p:extLst>
   </p:cSld>

</xml_diff>